<commit_message>
Fixed and improved problems with downloading videos. Fixed problem with hidden comments in YouTube videos. Added test.py
</commit_message>
<xml_diff>
--- a/Защита проекта.pptx
+++ b/Защита проекта.pptx
@@ -6230,8 +6230,8 @@
         </p:nvSpPr>
         <p:spPr>
           <a:xfrm>
-            <a:off x="4655755" y="283779"/>
-            <a:ext cx="2880491" cy="584775"/>
+            <a:off x="4328956" y="283779"/>
+            <a:ext cx="3534088" cy="584775"/>
           </a:xfrm>
           <a:prstGeom prst="rect">
             <a:avLst/>
@@ -6247,7 +6247,7 @@
             <a:pPr algn="ctr"/>
             <a:r>
               <a:rPr lang="ru-RU" sz="3200" dirty="0"/>
-              <a:t>Главное меню</a:t>
+              <a:t>Главная страница</a:t>
             </a:r>
             <a:endParaRPr lang="en-US" sz="3200" dirty="0"/>
           </a:p>

</xml_diff>